<commit_message>
Update 002 Javascript fundamentals.pptx
</commit_message>
<xml_diff>
--- a/GFG JS Course Curriculam/Articles/002 Javascript fundamentals.pptx
+++ b/GFG JS Course Curriculam/Articles/002 Javascript fundamentals.pptx
@@ -8934,7 +8934,7 @@
           <a:p>
             <a:fld id="{2CACDFC1-BBB1-447D-84E1-201D453CFC4D}" type="datetimeFigureOut">
               <a:rPr lang="en-IN" smtClean="0"/>
-              <a:t>17-12-2022</a:t>
+              <a:t>02-01-2023</a:t>
             </a:fld>
             <a:endParaRPr lang="en-IN"/>
           </a:p>
@@ -9141,7 +9141,7 @@
           <a:p>
             <a:fld id="{2CACDFC1-BBB1-447D-84E1-201D453CFC4D}" type="datetimeFigureOut">
               <a:rPr lang="en-IN" smtClean="0"/>
-              <a:t>17-12-2022</a:t>
+              <a:t>02-01-2023</a:t>
             </a:fld>
             <a:endParaRPr lang="en-IN"/>
           </a:p>
@@ -9321,7 +9321,7 @@
           <a:p>
             <a:fld id="{2CACDFC1-BBB1-447D-84E1-201D453CFC4D}" type="datetimeFigureOut">
               <a:rPr lang="en-IN" smtClean="0"/>
-              <a:t>17-12-2022</a:t>
+              <a:t>02-01-2023</a:t>
             </a:fld>
             <a:endParaRPr lang="en-IN"/>
           </a:p>
@@ -9526,7 +9526,7 @@
           <a:p>
             <a:fld id="{2CACDFC1-BBB1-447D-84E1-201D453CFC4D}" type="datetimeFigureOut">
               <a:rPr lang="en-IN" smtClean="0"/>
-              <a:t>17-12-2022</a:t>
+              <a:t>02-01-2023</a:t>
             </a:fld>
             <a:endParaRPr lang="en-IN"/>
           </a:p>
@@ -18424,7 +18424,7 @@
           <a:p>
             <a:fld id="{2CACDFC1-BBB1-447D-84E1-201D453CFC4D}" type="datetimeFigureOut">
               <a:rPr lang="en-IN" smtClean="0"/>
-              <a:t>17-12-2022</a:t>
+              <a:t>02-01-2023</a:t>
             </a:fld>
             <a:endParaRPr lang="en-IN"/>
           </a:p>
@@ -18698,7 +18698,7 @@
           <a:p>
             <a:fld id="{2CACDFC1-BBB1-447D-84E1-201D453CFC4D}" type="datetimeFigureOut">
               <a:rPr lang="en-IN" smtClean="0"/>
-              <a:t>17-12-2022</a:t>
+              <a:t>02-01-2023</a:t>
             </a:fld>
             <a:endParaRPr lang="en-IN"/>
           </a:p>
@@ -19096,7 +19096,7 @@
           <a:p>
             <a:fld id="{2CACDFC1-BBB1-447D-84E1-201D453CFC4D}" type="datetimeFigureOut">
               <a:rPr lang="en-IN" smtClean="0"/>
-              <a:t>17-12-2022</a:t>
+              <a:t>02-01-2023</a:t>
             </a:fld>
             <a:endParaRPr lang="en-IN"/>
           </a:p>
@@ -19214,7 +19214,7 @@
           <a:p>
             <a:fld id="{2CACDFC1-BBB1-447D-84E1-201D453CFC4D}" type="datetimeFigureOut">
               <a:rPr lang="en-IN" smtClean="0"/>
-              <a:t>17-12-2022</a:t>
+              <a:t>02-01-2023</a:t>
             </a:fld>
             <a:endParaRPr lang="en-IN"/>
           </a:p>
@@ -19309,7 +19309,7 @@
           <a:p>
             <a:fld id="{2CACDFC1-BBB1-447D-84E1-201D453CFC4D}" type="datetimeFigureOut">
               <a:rPr lang="en-IN" smtClean="0"/>
-              <a:t>17-12-2022</a:t>
+              <a:t>02-01-2023</a:t>
             </a:fld>
             <a:endParaRPr lang="en-IN"/>
           </a:p>
@@ -19599,7 +19599,7 @@
           <a:p>
             <a:fld id="{2CACDFC1-BBB1-447D-84E1-201D453CFC4D}" type="datetimeFigureOut">
               <a:rPr lang="en-IN" smtClean="0"/>
-              <a:t>17-12-2022</a:t>
+              <a:t>02-01-2023</a:t>
             </a:fld>
             <a:endParaRPr lang="en-IN"/>
           </a:p>
@@ -19879,7 +19879,7 @@
           <a:p>
             <a:fld id="{2CACDFC1-BBB1-447D-84E1-201D453CFC4D}" type="datetimeFigureOut">
               <a:rPr lang="en-IN" smtClean="0"/>
-              <a:t>17-12-2022</a:t>
+              <a:t>02-01-2023</a:t>
             </a:fld>
             <a:endParaRPr lang="en-IN"/>
           </a:p>
@@ -20129,7 +20129,7 @@
           <a:p>
             <a:fld id="{2CACDFC1-BBB1-447D-84E1-201D453CFC4D}" type="datetimeFigureOut">
               <a:rPr lang="en-IN" smtClean="0"/>
-              <a:t>17-12-2022</a:t>
+              <a:t>02-01-2023</a:t>
             </a:fld>
             <a:endParaRPr lang="en-IN"/>
           </a:p>
@@ -29617,15 +29617,6 @@
 </file>
 
 <file path=customXml/item1.xml><?xml version="1.0" encoding="utf-8"?>
-<?mso-contentType ?>
-<FormTemplates xmlns="http://schemas.microsoft.com/sharepoint/v3/contenttype/forms">
-  <Display>DocumentLibraryForm</Display>
-  <Edit>DocumentLibraryForm</Edit>
-  <New>DocumentLibraryForm</New>
-</FormTemplates>
-</file>
-
-<file path=customXml/item2.xml><?xml version="1.0" encoding="utf-8"?>
 <ct:contentTypeSchema xmlns:ct="http://schemas.microsoft.com/office/2006/metadata/contentType" xmlns:ma="http://schemas.microsoft.com/office/2006/metadata/properties/metaAttributes" ct:_="" ma:_="" ma:contentTypeName="Document" ma:contentTypeID="0x01010025EC667E64F3664AA9FF84395B73BBB2" ma:contentTypeVersion="12" ma:contentTypeDescription="Create a new document." ma:contentTypeScope="" ma:versionID="6b12c4ceb98f90cef75c2b4a7241f9ea">
   <xsd:schema xmlns:xsd="http://www.w3.org/2001/XMLSchema" xmlns:xs="http://www.w3.org/2001/XMLSchema" xmlns:p="http://schemas.microsoft.com/office/2006/metadata/properties" xmlns:ns2="11dab2fc-a00f-488b-a519-3911044eea4e" xmlns:ns3="202a9836-ee93-41fb-ba3c-167105785a0d" targetNamespace="http://schemas.microsoft.com/office/2006/metadata/properties" ma:root="true" ma:fieldsID="c1df371a784d1a7c3bc1d50e69810467" ns2:_="" ns3:_="">
     <xsd:import namespace="11dab2fc-a00f-488b-a519-3911044eea4e"/>
@@ -29842,15 +29833,16 @@
 </ct:contentTypeSchema>
 </file>
 
-<file path=customXml/itemProps1.xml><?xml version="1.0" encoding="utf-8"?>
-<ds:datastoreItem xmlns:ds="http://schemas.openxmlformats.org/officeDocument/2006/customXml" ds:itemID="{DF6393E9-DB80-41A4-9143-659888D2B622}">
-  <ds:schemaRefs>
-    <ds:schemaRef ds:uri="http://schemas.microsoft.com/sharepoint/v3/contenttype/forms"/>
-  </ds:schemaRefs>
-</ds:datastoreItem>
+<file path=customXml/item2.xml><?xml version="1.0" encoding="utf-8"?>
+<?mso-contentType ?>
+<FormTemplates xmlns="http://schemas.microsoft.com/sharepoint/v3/contenttype/forms">
+  <Display>DocumentLibraryForm</Display>
+  <Edit>DocumentLibraryForm</Edit>
+  <New>DocumentLibraryForm</New>
+</FormTemplates>
 </file>
 
-<file path=customXml/itemProps2.xml><?xml version="1.0" encoding="utf-8"?>
+<file path=customXml/itemProps1.xml><?xml version="1.0" encoding="utf-8"?>
 <ds:datastoreItem xmlns:ds="http://schemas.openxmlformats.org/officeDocument/2006/customXml" ds:itemID="{FA8C3721-CA78-4A53-A66E-A539345E019E}">
   <ds:schemaRefs>
     <ds:schemaRef ds:uri="http://schemas.microsoft.com/office/2006/metadata/contentType"/>
@@ -29867,4 +29859,18 @@
     <ds:schemaRef ds:uri="http://schemas.microsoft.com/internal/obd"/>
   </ds:schemaRefs>
 </ds:datastoreItem>
+</file>
+
+<file path=customXml/itemProps2.xml><?xml version="1.0" encoding="utf-8"?>
+<ds:datastoreItem xmlns:ds="http://schemas.openxmlformats.org/officeDocument/2006/customXml" ds:itemID="{DF6393E9-DB80-41A4-9143-659888D2B622}">
+  <ds:schemaRefs>
+    <ds:schemaRef ds:uri="http://schemas.microsoft.com/sharepoint/v3/contenttype/forms"/>
+  </ds:schemaRefs>
+</ds:datastoreItem>
+</file>
+
+<file path=docMetadata/LabelInfo.xml><?xml version="1.0" encoding="utf-8"?>
+<clbl:labelList xmlns:clbl="http://schemas.microsoft.com/office/2020/mipLabelMetadata">
+  <clbl:label id="{0bfa236d-8472-42aa-9a40-ab46036c5596}" enabled="1" method="Privileged" siteId="{e0793d39-0939-496d-b129-198edd916feb}" removed="0"/>
+</clbl:labelList>
 </file>
</xml_diff>